<commit_message>
this is a beginning
</commit_message>
<xml_diff>
--- a/week-03/day-03-05/Péter JOLÁNKAI demo 3.pptx
+++ b/week-03/day-03-05/Péter JOLÁNKAI demo 3.pptx
@@ -298,7 +298,7 @@
             <a:fld id="{3BC48CB6-E707-4CA7-8DD7-E3A65E07FCB1}" type="datetimeFigureOut">
               <a:rPr lang="hu-HU" smtClean="0"/>
               <a:pPr/>
-              <a:t>2017.10.18.</a:t>
+              <a:t>2017.10.19.</a:t>
             </a:fld>
             <a:endParaRPr lang="hu-HU"/>
           </a:p>
@@ -465,7 +465,7 @@
             <a:fld id="{3BC48CB6-E707-4CA7-8DD7-E3A65E07FCB1}" type="datetimeFigureOut">
               <a:rPr lang="hu-HU" smtClean="0"/>
               <a:pPr/>
-              <a:t>2017.10.18.</a:t>
+              <a:t>2017.10.19.</a:t>
             </a:fld>
             <a:endParaRPr lang="hu-HU"/>
           </a:p>
@@ -642,7 +642,7 @@
             <a:fld id="{3BC48CB6-E707-4CA7-8DD7-E3A65E07FCB1}" type="datetimeFigureOut">
               <a:rPr lang="hu-HU" smtClean="0"/>
               <a:pPr/>
-              <a:t>2017.10.18.</a:t>
+              <a:t>2017.10.19.</a:t>
             </a:fld>
             <a:endParaRPr lang="hu-HU"/>
           </a:p>
@@ -809,7 +809,7 @@
             <a:fld id="{3BC48CB6-E707-4CA7-8DD7-E3A65E07FCB1}" type="datetimeFigureOut">
               <a:rPr lang="hu-HU" smtClean="0"/>
               <a:pPr/>
-              <a:t>2017.10.18.</a:t>
+              <a:t>2017.10.19.</a:t>
             </a:fld>
             <a:endParaRPr lang="hu-HU"/>
           </a:p>
@@ -1052,7 +1052,7 @@
             <a:fld id="{3BC48CB6-E707-4CA7-8DD7-E3A65E07FCB1}" type="datetimeFigureOut">
               <a:rPr lang="hu-HU" smtClean="0"/>
               <a:pPr/>
-              <a:t>2017.10.18.</a:t>
+              <a:t>2017.10.19.</a:t>
             </a:fld>
             <a:endParaRPr lang="hu-HU"/>
           </a:p>
@@ -1337,7 +1337,7 @@
             <a:fld id="{3BC48CB6-E707-4CA7-8DD7-E3A65E07FCB1}" type="datetimeFigureOut">
               <a:rPr lang="hu-HU" smtClean="0"/>
               <a:pPr/>
-              <a:t>2017.10.18.</a:t>
+              <a:t>2017.10.19.</a:t>
             </a:fld>
             <a:endParaRPr lang="hu-HU"/>
           </a:p>
@@ -1756,7 +1756,7 @@
             <a:fld id="{3BC48CB6-E707-4CA7-8DD7-E3A65E07FCB1}" type="datetimeFigureOut">
               <a:rPr lang="hu-HU" smtClean="0"/>
               <a:pPr/>
-              <a:t>2017.10.18.</a:t>
+              <a:t>2017.10.19.</a:t>
             </a:fld>
             <a:endParaRPr lang="hu-HU"/>
           </a:p>
@@ -1871,7 +1871,7 @@
             <a:fld id="{3BC48CB6-E707-4CA7-8DD7-E3A65E07FCB1}" type="datetimeFigureOut">
               <a:rPr lang="hu-HU" smtClean="0"/>
               <a:pPr/>
-              <a:t>2017.10.18.</a:t>
+              <a:t>2017.10.19.</a:t>
             </a:fld>
             <a:endParaRPr lang="hu-HU"/>
           </a:p>
@@ -1963,7 +1963,7 @@
             <a:fld id="{3BC48CB6-E707-4CA7-8DD7-E3A65E07FCB1}" type="datetimeFigureOut">
               <a:rPr lang="hu-HU" smtClean="0"/>
               <a:pPr/>
-              <a:t>2017.10.18.</a:t>
+              <a:t>2017.10.19.</a:t>
             </a:fld>
             <a:endParaRPr lang="hu-HU"/>
           </a:p>
@@ -2237,7 +2237,7 @@
             <a:fld id="{3BC48CB6-E707-4CA7-8DD7-E3A65E07FCB1}" type="datetimeFigureOut">
               <a:rPr lang="hu-HU" smtClean="0"/>
               <a:pPr/>
-              <a:t>2017.10.18.</a:t>
+              <a:t>2017.10.19.</a:t>
             </a:fld>
             <a:endParaRPr lang="hu-HU"/>
           </a:p>
@@ -2487,7 +2487,7 @@
             <a:fld id="{3BC48CB6-E707-4CA7-8DD7-E3A65E07FCB1}" type="datetimeFigureOut">
               <a:rPr lang="hu-HU" smtClean="0"/>
               <a:pPr/>
-              <a:t>2017.10.18.</a:t>
+              <a:t>2017.10.19.</a:t>
             </a:fld>
             <a:endParaRPr lang="hu-HU"/>
           </a:p>
@@ -2723,7 +2723,7 @@
             <a:fld id="{3BC48CB6-E707-4CA7-8DD7-E3A65E07FCB1}" type="datetimeFigureOut">
               <a:rPr lang="hu-HU" smtClean="0"/>
               <a:pPr/>
-              <a:t>2017.10.18.</a:t>
+              <a:t>2017.10.19.</a:t>
             </a:fld>
             <a:endParaRPr lang="hu-HU"/>
           </a:p>
@@ -3145,8 +3145,8 @@
           <a:lstStyle/>
           <a:p>
             <a:r>
-              <a:rPr lang="hu-HU" dirty="0" smtClean="0"/>
-              <a:t>2rd  </a:t>
+              <a:rPr lang="hu-HU" smtClean="0"/>
+              <a:t>3rd  </a:t>
             </a:r>
             <a:r>
               <a:rPr lang="hu-HU" dirty="0" smtClean="0"/>
@@ -3413,7 +3413,6 @@
               <a:rPr lang="hu-HU" sz="3200" dirty="0" smtClean="0"/>
               <a:t> </a:t>
             </a:r>
-            <a:endParaRPr lang="hu-HU" sz="3200" dirty="0" smtClean="0"/>
           </a:p>
           <a:p>
             <a:pPr lvl="0" algn="ctr">

</xml_diff>